<commit_message>
fix image, update readme
</commit_message>
<xml_diff>
--- a/poster-files/figure_transfer_Learning_schematic.pptx
+++ b/poster-files/figure_transfer_Learning_schematic.pptx
@@ -2,16 +2,15 @@
 <file path=ppt/presentation.xml><?xml version="1.0" encoding="utf-8"?>
 <p:presentation xmlns:a="http://schemas.openxmlformats.org/drawingml/2006/main" xmlns:r="http://schemas.openxmlformats.org/officeDocument/2006/relationships" xmlns:p="http://schemas.openxmlformats.org/presentationml/2006/main" saveSubsetFonts="1" autoCompressPictures="0">
   <p:sldMasterIdLst>
-    <p:sldMasterId id="2147483684" r:id="rId1"/>
+    <p:sldMasterId id="2147483696" r:id="rId1"/>
   </p:sldMasterIdLst>
   <p:notesMasterIdLst>
-    <p:notesMasterId r:id="rId4"/>
+    <p:notesMasterId r:id="rId3"/>
   </p:notesMasterIdLst>
   <p:sldIdLst>
-    <p:sldId id="256" r:id="rId2"/>
-    <p:sldId id="257" r:id="rId3"/>
+    <p:sldId id="257" r:id="rId2"/>
   </p:sldIdLst>
-  <p:sldSz cx="6858000" cy="14630400"/>
+  <p:sldSz cx="6035675" cy="14630400"/>
   <p:notesSz cx="6858000" cy="9144000"/>
   <p:defaultTextStyle>
     <a:defPPr>
@@ -108,6 +107,11 @@
       </a:defRPr>
     </a:lvl9pPr>
   </p:defaultTextStyle>
+  <p:extLst>
+    <p:ext uri="{EFAFB233-063F-42B5-8137-9DF3F51BA10A}">
+      <p15:sldGuideLst xmlns:p15="http://schemas.microsoft.com/office/powerpoint/2012/main"/>
+    </p:ext>
+  </p:extLst>
 </p:presentation>
 </file>
 
@@ -211,8 +215,8 @@
         </p:nvSpPr>
         <p:spPr>
           <a:xfrm>
-            <a:off x="2705100" y="1143000"/>
-            <a:ext cx="1447800" cy="3086100"/>
+            <a:off x="2792413" y="1143000"/>
+            <a:ext cx="1273175" cy="3086100"/>
           </a:xfrm>
           <a:prstGeom prst="rect">
             <a:avLst/>
@@ -490,8 +494,8 @@
         </p:nvSpPr>
         <p:spPr>
           <a:xfrm>
-            <a:off x="2705100" y="1143000"/>
-            <a:ext cx="1447800" cy="3086100"/>
+            <a:off x="2792413" y="1143000"/>
+            <a:ext cx="1273175" cy="3086100"/>
           </a:xfrm>
         </p:spPr>
       </p:sp>
@@ -531,7 +535,7 @@
           <a:p>
             <a:fld id="{3C8100DC-A0C8-A041-A05B-548E6A0F6F6C}" type="slidenum">
               <a:rPr lang="en-US" smtClean="0"/>
-              <a:t>2</a:t>
+              <a:t>1</a:t>
             </a:fld>
             <a:endParaRPr lang="en-US"/>
           </a:p>
@@ -579,15 +583,15 @@
         </p:nvSpPr>
         <p:spPr>
           <a:xfrm>
-            <a:off x="514350" y="2394374"/>
-            <a:ext cx="5829300" cy="5093547"/>
+            <a:off x="452676" y="2394374"/>
+            <a:ext cx="5130324" cy="5093547"/>
           </a:xfrm>
         </p:spPr>
         <p:txBody>
           <a:bodyPr anchor="b"/>
           <a:lstStyle>
             <a:lvl1pPr algn="ctr">
-              <a:defRPr sz="4500"/>
+              <a:defRPr sz="3961"/>
             </a:lvl1pPr>
           </a:lstStyle>
           <a:p>
@@ -611,8 +615,8 @@
         </p:nvSpPr>
         <p:spPr>
           <a:xfrm>
-            <a:off x="857250" y="7684348"/>
-            <a:ext cx="5143500" cy="3532292"/>
+            <a:off x="754460" y="7684348"/>
+            <a:ext cx="4526756" cy="3532292"/>
           </a:xfrm>
         </p:spPr>
         <p:txBody>
@@ -620,39 +624,39 @@
           <a:lstStyle>
             <a:lvl1pPr marL="0" indent="0" algn="ctr">
               <a:buNone/>
-              <a:defRPr sz="1800"/>
+              <a:defRPr sz="1584"/>
             </a:lvl1pPr>
-            <a:lvl2pPr marL="342900" indent="0" algn="ctr">
+            <a:lvl2pPr marL="301798" indent="0" algn="ctr">
               <a:buNone/>
-              <a:defRPr sz="1500"/>
+              <a:defRPr sz="1320"/>
             </a:lvl2pPr>
-            <a:lvl3pPr marL="685800" indent="0" algn="ctr">
+            <a:lvl3pPr marL="603595" indent="0" algn="ctr">
               <a:buNone/>
-              <a:defRPr sz="1350"/>
+              <a:defRPr sz="1188"/>
             </a:lvl3pPr>
-            <a:lvl4pPr marL="1028700" indent="0" algn="ctr">
+            <a:lvl4pPr marL="905393" indent="0" algn="ctr">
               <a:buNone/>
-              <a:defRPr sz="1200"/>
+              <a:defRPr sz="1056"/>
             </a:lvl4pPr>
-            <a:lvl5pPr marL="1371600" indent="0" algn="ctr">
+            <a:lvl5pPr marL="1207191" indent="0" algn="ctr">
               <a:buNone/>
-              <a:defRPr sz="1200"/>
+              <a:defRPr sz="1056"/>
             </a:lvl5pPr>
-            <a:lvl6pPr marL="1714500" indent="0" algn="ctr">
+            <a:lvl6pPr marL="1508989" indent="0" algn="ctr">
               <a:buNone/>
-              <a:defRPr sz="1200"/>
+              <a:defRPr sz="1056"/>
             </a:lvl6pPr>
-            <a:lvl7pPr marL="2057400" indent="0" algn="ctr">
+            <a:lvl7pPr marL="1810786" indent="0" algn="ctr">
               <a:buNone/>
-              <a:defRPr sz="1200"/>
+              <a:defRPr sz="1056"/>
             </a:lvl7pPr>
-            <a:lvl8pPr marL="2400300" indent="0" algn="ctr">
+            <a:lvl8pPr marL="2112584" indent="0" algn="ctr">
               <a:buNone/>
-              <a:defRPr sz="1200"/>
+              <a:defRPr sz="1056"/>
             </a:lvl8pPr>
-            <a:lvl9pPr marL="2743200" indent="0" algn="ctr">
+            <a:lvl9pPr marL="2414382" indent="0" algn="ctr">
               <a:buNone/>
-              <a:defRPr sz="1200"/>
+              <a:defRPr sz="1056"/>
             </a:lvl9pPr>
           </a:lstStyle>
           <a:p>
@@ -732,7 +736,7 @@
     </p:spTree>
     <p:extLst>
       <p:ext uri="{BB962C8B-B14F-4D97-AF65-F5344CB8AC3E}">
-        <p14:creationId xmlns:p14="http://schemas.microsoft.com/office/powerpoint/2010/main" val="1912656424"/>
+        <p14:creationId xmlns:p14="http://schemas.microsoft.com/office/powerpoint/2010/main" val="1385925890"/>
       </p:ext>
     </p:extLst>
   </p:cSld>
@@ -902,7 +906,7 @@
     </p:spTree>
     <p:extLst>
       <p:ext uri="{BB962C8B-B14F-4D97-AF65-F5344CB8AC3E}">
-        <p14:creationId xmlns:p14="http://schemas.microsoft.com/office/powerpoint/2010/main" val="909475154"/>
+        <p14:creationId xmlns:p14="http://schemas.microsoft.com/office/powerpoint/2010/main" val="1788656145"/>
       </p:ext>
     </p:extLst>
   </p:cSld>
@@ -941,8 +945,8 @@
         </p:nvSpPr>
         <p:spPr>
           <a:xfrm>
-            <a:off x="4907757" y="778933"/>
-            <a:ext cx="1478756" cy="12398588"/>
+            <a:off x="4319280" y="778933"/>
+            <a:ext cx="1301442" cy="12398588"/>
           </a:xfrm>
         </p:spPr>
         <p:txBody>
@@ -969,8 +973,8 @@
         </p:nvSpPr>
         <p:spPr>
           <a:xfrm>
-            <a:off x="471488" y="778933"/>
-            <a:ext cx="4350544" cy="12398588"/>
+            <a:off x="414953" y="778933"/>
+            <a:ext cx="3828881" cy="12398588"/>
           </a:xfrm>
         </p:spPr>
         <p:txBody>
@@ -1082,7 +1086,7 @@
     </p:spTree>
     <p:extLst>
       <p:ext uri="{BB962C8B-B14F-4D97-AF65-F5344CB8AC3E}">
-        <p14:creationId xmlns:p14="http://schemas.microsoft.com/office/powerpoint/2010/main" val="1907797579"/>
+        <p14:creationId xmlns:p14="http://schemas.microsoft.com/office/powerpoint/2010/main" val="1467738309"/>
       </p:ext>
     </p:extLst>
   </p:cSld>
@@ -1252,7 +1256,7 @@
     </p:spTree>
     <p:extLst>
       <p:ext uri="{BB962C8B-B14F-4D97-AF65-F5344CB8AC3E}">
-        <p14:creationId xmlns:p14="http://schemas.microsoft.com/office/powerpoint/2010/main" val="333806225"/>
+        <p14:creationId xmlns:p14="http://schemas.microsoft.com/office/powerpoint/2010/main" val="1648797868"/>
       </p:ext>
     </p:extLst>
   </p:cSld>
@@ -1291,15 +1295,15 @@
         </p:nvSpPr>
         <p:spPr>
           <a:xfrm>
-            <a:off x="467916" y="3647444"/>
-            <a:ext cx="5915025" cy="6085839"/>
+            <a:off x="411809" y="3647444"/>
+            <a:ext cx="5205770" cy="6085839"/>
           </a:xfrm>
         </p:spPr>
         <p:txBody>
           <a:bodyPr anchor="b"/>
           <a:lstStyle>
             <a:lvl1pPr>
-              <a:defRPr sz="4500"/>
+              <a:defRPr sz="3961"/>
             </a:lvl1pPr>
           </a:lstStyle>
           <a:p>
@@ -1323,8 +1327,8 @@
         </p:nvSpPr>
         <p:spPr>
           <a:xfrm>
-            <a:off x="467916" y="9790858"/>
-            <a:ext cx="5915025" cy="3200399"/>
+            <a:off x="411809" y="9790858"/>
+            <a:ext cx="5205770" cy="3200399"/>
           </a:xfrm>
         </p:spPr>
         <p:txBody>
@@ -1332,15 +1336,15 @@
           <a:lstStyle>
             <a:lvl1pPr marL="0" indent="0">
               <a:buNone/>
-              <a:defRPr sz="1800">
+              <a:defRPr sz="1584">
                 <a:solidFill>
                   <a:schemeClr val="tx1"/>
                 </a:solidFill>
               </a:defRPr>
             </a:lvl1pPr>
-            <a:lvl2pPr marL="342900" indent="0">
+            <a:lvl2pPr marL="301798" indent="0">
               <a:buNone/>
-              <a:defRPr sz="1500">
+              <a:defRPr sz="1320">
                 <a:solidFill>
                   <a:schemeClr val="tx1">
                     <a:tint val="75000"/>
@@ -1348,9 +1352,9 @@
                 </a:solidFill>
               </a:defRPr>
             </a:lvl2pPr>
-            <a:lvl3pPr marL="685800" indent="0">
+            <a:lvl3pPr marL="603595" indent="0">
               <a:buNone/>
-              <a:defRPr sz="1350">
+              <a:defRPr sz="1188">
                 <a:solidFill>
                   <a:schemeClr val="tx1">
                     <a:tint val="75000"/>
@@ -1358,9 +1362,9 @@
                 </a:solidFill>
               </a:defRPr>
             </a:lvl3pPr>
-            <a:lvl4pPr marL="1028700" indent="0">
+            <a:lvl4pPr marL="905393" indent="0">
               <a:buNone/>
-              <a:defRPr sz="1200">
+              <a:defRPr sz="1056">
                 <a:solidFill>
                   <a:schemeClr val="tx1">
                     <a:tint val="75000"/>
@@ -1368,9 +1372,9 @@
                 </a:solidFill>
               </a:defRPr>
             </a:lvl4pPr>
-            <a:lvl5pPr marL="1371600" indent="0">
+            <a:lvl5pPr marL="1207191" indent="0">
               <a:buNone/>
-              <a:defRPr sz="1200">
+              <a:defRPr sz="1056">
                 <a:solidFill>
                   <a:schemeClr val="tx1">
                     <a:tint val="75000"/>
@@ -1378,9 +1382,9 @@
                 </a:solidFill>
               </a:defRPr>
             </a:lvl5pPr>
-            <a:lvl6pPr marL="1714500" indent="0">
+            <a:lvl6pPr marL="1508989" indent="0">
               <a:buNone/>
-              <a:defRPr sz="1200">
+              <a:defRPr sz="1056">
                 <a:solidFill>
                   <a:schemeClr val="tx1">
                     <a:tint val="75000"/>
@@ -1388,9 +1392,9 @@
                 </a:solidFill>
               </a:defRPr>
             </a:lvl6pPr>
-            <a:lvl7pPr marL="2057400" indent="0">
+            <a:lvl7pPr marL="1810786" indent="0">
               <a:buNone/>
-              <a:defRPr sz="1200">
+              <a:defRPr sz="1056">
                 <a:solidFill>
                   <a:schemeClr val="tx1">
                     <a:tint val="75000"/>
@@ -1398,9 +1402,9 @@
                 </a:solidFill>
               </a:defRPr>
             </a:lvl7pPr>
-            <a:lvl8pPr marL="2400300" indent="0">
+            <a:lvl8pPr marL="2112584" indent="0">
               <a:buNone/>
-              <a:defRPr sz="1200">
+              <a:defRPr sz="1056">
                 <a:solidFill>
                   <a:schemeClr val="tx1">
                     <a:tint val="75000"/>
@@ -1408,9 +1412,9 @@
                 </a:solidFill>
               </a:defRPr>
             </a:lvl8pPr>
-            <a:lvl9pPr marL="2743200" indent="0">
+            <a:lvl9pPr marL="2414382" indent="0">
               <a:buNone/>
-              <a:defRPr sz="1200">
+              <a:defRPr sz="1056">
                 <a:solidFill>
                   <a:schemeClr val="tx1">
                     <a:tint val="75000"/>
@@ -1496,7 +1500,7 @@
     </p:spTree>
     <p:extLst>
       <p:ext uri="{BB962C8B-B14F-4D97-AF65-F5344CB8AC3E}">
-        <p14:creationId xmlns:p14="http://schemas.microsoft.com/office/powerpoint/2010/main" val="1053937611"/>
+        <p14:creationId xmlns:p14="http://schemas.microsoft.com/office/powerpoint/2010/main" val="216786588"/>
       </p:ext>
     </p:extLst>
   </p:cSld>
@@ -1558,8 +1562,8 @@
         </p:nvSpPr>
         <p:spPr>
           <a:xfrm>
-            <a:off x="471488" y="3894667"/>
-            <a:ext cx="2914650" cy="9282854"/>
+            <a:off x="414953" y="3894667"/>
+            <a:ext cx="2565162" cy="9282854"/>
           </a:xfrm>
         </p:spPr>
         <p:txBody>
@@ -1615,8 +1619,8 @@
         </p:nvSpPr>
         <p:spPr>
           <a:xfrm>
-            <a:off x="3471863" y="3894667"/>
-            <a:ext cx="2914650" cy="9282854"/>
+            <a:off x="3055560" y="3894667"/>
+            <a:ext cx="2565162" cy="9282854"/>
           </a:xfrm>
         </p:spPr>
         <p:txBody>
@@ -1728,7 +1732,7 @@
     </p:spTree>
     <p:extLst>
       <p:ext uri="{BB962C8B-B14F-4D97-AF65-F5344CB8AC3E}">
-        <p14:creationId xmlns:p14="http://schemas.microsoft.com/office/powerpoint/2010/main" val="1084307621"/>
+        <p14:creationId xmlns:p14="http://schemas.microsoft.com/office/powerpoint/2010/main" val="1399919204"/>
       </p:ext>
     </p:extLst>
   </p:cSld>
@@ -1767,8 +1771,8 @@
         </p:nvSpPr>
         <p:spPr>
           <a:xfrm>
-            <a:off x="472381" y="778936"/>
-            <a:ext cx="5915025" cy="2827868"/>
+            <a:off x="415739" y="778936"/>
+            <a:ext cx="5205770" cy="2827868"/>
           </a:xfrm>
         </p:spPr>
         <p:txBody>
@@ -1795,8 +1799,8 @@
         </p:nvSpPr>
         <p:spPr>
           <a:xfrm>
-            <a:off x="472381" y="3586481"/>
-            <a:ext cx="2901255" cy="1757679"/>
+            <a:off x="415739" y="3586481"/>
+            <a:ext cx="2553373" cy="1757679"/>
           </a:xfrm>
         </p:spPr>
         <p:txBody>
@@ -1804,39 +1808,39 @@
           <a:lstStyle>
             <a:lvl1pPr marL="0" indent="0">
               <a:buNone/>
-              <a:defRPr sz="1800" b="1"/>
+              <a:defRPr sz="1584" b="1"/>
             </a:lvl1pPr>
-            <a:lvl2pPr marL="342900" indent="0">
+            <a:lvl2pPr marL="301798" indent="0">
               <a:buNone/>
-              <a:defRPr sz="1500" b="1"/>
+              <a:defRPr sz="1320" b="1"/>
             </a:lvl2pPr>
-            <a:lvl3pPr marL="685800" indent="0">
+            <a:lvl3pPr marL="603595" indent="0">
               <a:buNone/>
-              <a:defRPr sz="1350" b="1"/>
+              <a:defRPr sz="1188" b="1"/>
             </a:lvl3pPr>
-            <a:lvl4pPr marL="1028700" indent="0">
+            <a:lvl4pPr marL="905393" indent="0">
               <a:buNone/>
-              <a:defRPr sz="1200" b="1"/>
+              <a:defRPr sz="1056" b="1"/>
             </a:lvl4pPr>
-            <a:lvl5pPr marL="1371600" indent="0">
+            <a:lvl5pPr marL="1207191" indent="0">
               <a:buNone/>
-              <a:defRPr sz="1200" b="1"/>
+              <a:defRPr sz="1056" b="1"/>
             </a:lvl5pPr>
-            <a:lvl6pPr marL="1714500" indent="0">
+            <a:lvl6pPr marL="1508989" indent="0">
               <a:buNone/>
-              <a:defRPr sz="1200" b="1"/>
+              <a:defRPr sz="1056" b="1"/>
             </a:lvl6pPr>
-            <a:lvl7pPr marL="2057400" indent="0">
+            <a:lvl7pPr marL="1810786" indent="0">
               <a:buNone/>
-              <a:defRPr sz="1200" b="1"/>
+              <a:defRPr sz="1056" b="1"/>
             </a:lvl7pPr>
-            <a:lvl8pPr marL="2400300" indent="0">
+            <a:lvl8pPr marL="2112584" indent="0">
               <a:buNone/>
-              <a:defRPr sz="1200" b="1"/>
+              <a:defRPr sz="1056" b="1"/>
             </a:lvl8pPr>
-            <a:lvl9pPr marL="2743200" indent="0">
+            <a:lvl9pPr marL="2414382" indent="0">
               <a:buNone/>
-              <a:defRPr sz="1200" b="1"/>
+              <a:defRPr sz="1056" b="1"/>
             </a:lvl9pPr>
           </a:lstStyle>
           <a:p>
@@ -1860,8 +1864,8 @@
         </p:nvSpPr>
         <p:spPr>
           <a:xfrm>
-            <a:off x="472381" y="5344160"/>
-            <a:ext cx="2901255" cy="7860454"/>
+            <a:off x="415739" y="5344160"/>
+            <a:ext cx="2553373" cy="7860454"/>
           </a:xfrm>
         </p:spPr>
         <p:txBody>
@@ -1917,8 +1921,8 @@
         </p:nvSpPr>
         <p:spPr>
           <a:xfrm>
-            <a:off x="3471863" y="3586481"/>
-            <a:ext cx="2915543" cy="1757679"/>
+            <a:off x="3055561" y="3586481"/>
+            <a:ext cx="2565948" cy="1757679"/>
           </a:xfrm>
         </p:spPr>
         <p:txBody>
@@ -1926,39 +1930,39 @@
           <a:lstStyle>
             <a:lvl1pPr marL="0" indent="0">
               <a:buNone/>
-              <a:defRPr sz="1800" b="1"/>
+              <a:defRPr sz="1584" b="1"/>
             </a:lvl1pPr>
-            <a:lvl2pPr marL="342900" indent="0">
+            <a:lvl2pPr marL="301798" indent="0">
               <a:buNone/>
-              <a:defRPr sz="1500" b="1"/>
+              <a:defRPr sz="1320" b="1"/>
             </a:lvl2pPr>
-            <a:lvl3pPr marL="685800" indent="0">
+            <a:lvl3pPr marL="603595" indent="0">
               <a:buNone/>
-              <a:defRPr sz="1350" b="1"/>
+              <a:defRPr sz="1188" b="1"/>
             </a:lvl3pPr>
-            <a:lvl4pPr marL="1028700" indent="0">
+            <a:lvl4pPr marL="905393" indent="0">
               <a:buNone/>
-              <a:defRPr sz="1200" b="1"/>
+              <a:defRPr sz="1056" b="1"/>
             </a:lvl4pPr>
-            <a:lvl5pPr marL="1371600" indent="0">
+            <a:lvl5pPr marL="1207191" indent="0">
               <a:buNone/>
-              <a:defRPr sz="1200" b="1"/>
+              <a:defRPr sz="1056" b="1"/>
             </a:lvl5pPr>
-            <a:lvl6pPr marL="1714500" indent="0">
+            <a:lvl6pPr marL="1508989" indent="0">
               <a:buNone/>
-              <a:defRPr sz="1200" b="1"/>
+              <a:defRPr sz="1056" b="1"/>
             </a:lvl6pPr>
-            <a:lvl7pPr marL="2057400" indent="0">
+            <a:lvl7pPr marL="1810786" indent="0">
               <a:buNone/>
-              <a:defRPr sz="1200" b="1"/>
+              <a:defRPr sz="1056" b="1"/>
             </a:lvl7pPr>
-            <a:lvl8pPr marL="2400300" indent="0">
+            <a:lvl8pPr marL="2112584" indent="0">
               <a:buNone/>
-              <a:defRPr sz="1200" b="1"/>
+              <a:defRPr sz="1056" b="1"/>
             </a:lvl8pPr>
-            <a:lvl9pPr marL="2743200" indent="0">
+            <a:lvl9pPr marL="2414382" indent="0">
               <a:buNone/>
-              <a:defRPr sz="1200" b="1"/>
+              <a:defRPr sz="1056" b="1"/>
             </a:lvl9pPr>
           </a:lstStyle>
           <a:p>
@@ -1982,8 +1986,8 @@
         </p:nvSpPr>
         <p:spPr>
           <a:xfrm>
-            <a:off x="3471863" y="5344160"/>
-            <a:ext cx="2915543" cy="7860454"/>
+            <a:off x="3055561" y="5344160"/>
+            <a:ext cx="2565948" cy="7860454"/>
           </a:xfrm>
         </p:spPr>
         <p:txBody>
@@ -2095,7 +2099,7 @@
     </p:spTree>
     <p:extLst>
       <p:ext uri="{BB962C8B-B14F-4D97-AF65-F5344CB8AC3E}">
-        <p14:creationId xmlns:p14="http://schemas.microsoft.com/office/powerpoint/2010/main" val="411957705"/>
+        <p14:creationId xmlns:p14="http://schemas.microsoft.com/office/powerpoint/2010/main" val="611225096"/>
       </p:ext>
     </p:extLst>
   </p:cSld>
@@ -2213,7 +2217,7 @@
     </p:spTree>
     <p:extLst>
       <p:ext uri="{BB962C8B-B14F-4D97-AF65-F5344CB8AC3E}">
-        <p14:creationId xmlns:p14="http://schemas.microsoft.com/office/powerpoint/2010/main" val="285870007"/>
+        <p14:creationId xmlns:p14="http://schemas.microsoft.com/office/powerpoint/2010/main" val="1445904871"/>
       </p:ext>
     </p:extLst>
   </p:cSld>
@@ -2308,7 +2312,7 @@
     </p:spTree>
     <p:extLst>
       <p:ext uri="{BB962C8B-B14F-4D97-AF65-F5344CB8AC3E}">
-        <p14:creationId xmlns:p14="http://schemas.microsoft.com/office/powerpoint/2010/main" val="696289310"/>
+        <p14:creationId xmlns:p14="http://schemas.microsoft.com/office/powerpoint/2010/main" val="398217445"/>
       </p:ext>
     </p:extLst>
   </p:cSld>
@@ -2347,15 +2351,15 @@
         </p:nvSpPr>
         <p:spPr>
           <a:xfrm>
-            <a:off x="472381" y="975360"/>
-            <a:ext cx="2211884" cy="3413760"/>
+            <a:off x="415739" y="975360"/>
+            <a:ext cx="1946662" cy="3413760"/>
           </a:xfrm>
         </p:spPr>
         <p:txBody>
           <a:bodyPr anchor="b"/>
           <a:lstStyle>
             <a:lvl1pPr>
-              <a:defRPr sz="2400"/>
+              <a:defRPr sz="2112"/>
             </a:lvl1pPr>
           </a:lstStyle>
           <a:p>
@@ -2379,39 +2383,39 @@
         </p:nvSpPr>
         <p:spPr>
           <a:xfrm>
-            <a:off x="2915543" y="2106510"/>
-            <a:ext cx="3471863" cy="10397067"/>
+            <a:off x="2565948" y="2106510"/>
+            <a:ext cx="3055560" cy="10397067"/>
           </a:xfrm>
         </p:spPr>
         <p:txBody>
           <a:bodyPr/>
           <a:lstStyle>
             <a:lvl1pPr>
-              <a:defRPr sz="2400"/>
+              <a:defRPr sz="2112"/>
             </a:lvl1pPr>
             <a:lvl2pPr>
-              <a:defRPr sz="2100"/>
+              <a:defRPr sz="1848"/>
             </a:lvl2pPr>
             <a:lvl3pPr>
-              <a:defRPr sz="1800"/>
+              <a:defRPr sz="1584"/>
             </a:lvl3pPr>
             <a:lvl4pPr>
-              <a:defRPr sz="1500"/>
+              <a:defRPr sz="1320"/>
             </a:lvl4pPr>
             <a:lvl5pPr>
-              <a:defRPr sz="1500"/>
+              <a:defRPr sz="1320"/>
             </a:lvl5pPr>
             <a:lvl6pPr>
-              <a:defRPr sz="1500"/>
+              <a:defRPr sz="1320"/>
             </a:lvl6pPr>
             <a:lvl7pPr>
-              <a:defRPr sz="1500"/>
+              <a:defRPr sz="1320"/>
             </a:lvl7pPr>
             <a:lvl8pPr>
-              <a:defRPr sz="1500"/>
+              <a:defRPr sz="1320"/>
             </a:lvl8pPr>
             <a:lvl9pPr>
-              <a:defRPr sz="1500"/>
+              <a:defRPr sz="1320"/>
             </a:lvl9pPr>
           </a:lstStyle>
           <a:p>
@@ -2464,8 +2468,8 @@
         </p:nvSpPr>
         <p:spPr>
           <a:xfrm>
-            <a:off x="472381" y="4389120"/>
-            <a:ext cx="2211884" cy="8131388"/>
+            <a:off x="415739" y="4389120"/>
+            <a:ext cx="1946662" cy="8131388"/>
           </a:xfrm>
         </p:spPr>
         <p:txBody>
@@ -2473,39 +2477,39 @@
           <a:lstStyle>
             <a:lvl1pPr marL="0" indent="0">
               <a:buNone/>
-              <a:defRPr sz="1200"/>
+              <a:defRPr sz="1056"/>
             </a:lvl1pPr>
-            <a:lvl2pPr marL="342900" indent="0">
+            <a:lvl2pPr marL="301798" indent="0">
               <a:buNone/>
-              <a:defRPr sz="1050"/>
+              <a:defRPr sz="924"/>
             </a:lvl2pPr>
-            <a:lvl3pPr marL="685800" indent="0">
+            <a:lvl3pPr marL="603595" indent="0">
               <a:buNone/>
-              <a:defRPr sz="900"/>
+              <a:defRPr sz="792"/>
             </a:lvl3pPr>
-            <a:lvl4pPr marL="1028700" indent="0">
+            <a:lvl4pPr marL="905393" indent="0">
               <a:buNone/>
-              <a:defRPr sz="750"/>
+              <a:defRPr sz="660"/>
             </a:lvl4pPr>
-            <a:lvl5pPr marL="1371600" indent="0">
+            <a:lvl5pPr marL="1207191" indent="0">
               <a:buNone/>
-              <a:defRPr sz="750"/>
+              <a:defRPr sz="660"/>
             </a:lvl5pPr>
-            <a:lvl6pPr marL="1714500" indent="0">
+            <a:lvl6pPr marL="1508989" indent="0">
               <a:buNone/>
-              <a:defRPr sz="750"/>
+              <a:defRPr sz="660"/>
             </a:lvl6pPr>
-            <a:lvl7pPr marL="2057400" indent="0">
+            <a:lvl7pPr marL="1810786" indent="0">
               <a:buNone/>
-              <a:defRPr sz="750"/>
+              <a:defRPr sz="660"/>
             </a:lvl7pPr>
-            <a:lvl8pPr marL="2400300" indent="0">
+            <a:lvl8pPr marL="2112584" indent="0">
               <a:buNone/>
-              <a:defRPr sz="750"/>
+              <a:defRPr sz="660"/>
             </a:lvl8pPr>
-            <a:lvl9pPr marL="2743200" indent="0">
+            <a:lvl9pPr marL="2414382" indent="0">
               <a:buNone/>
-              <a:defRPr sz="750"/>
+              <a:defRPr sz="660"/>
             </a:lvl9pPr>
           </a:lstStyle>
           <a:p>
@@ -2585,7 +2589,7 @@
     </p:spTree>
     <p:extLst>
       <p:ext uri="{BB962C8B-B14F-4D97-AF65-F5344CB8AC3E}">
-        <p14:creationId xmlns:p14="http://schemas.microsoft.com/office/powerpoint/2010/main" val="896040667"/>
+        <p14:creationId xmlns:p14="http://schemas.microsoft.com/office/powerpoint/2010/main" val="1281554063"/>
       </p:ext>
     </p:extLst>
   </p:cSld>
@@ -2624,15 +2628,15 @@
         </p:nvSpPr>
         <p:spPr>
           <a:xfrm>
-            <a:off x="472381" y="975360"/>
-            <a:ext cx="2211884" cy="3413760"/>
+            <a:off x="415739" y="975360"/>
+            <a:ext cx="1946662" cy="3413760"/>
           </a:xfrm>
         </p:spPr>
         <p:txBody>
           <a:bodyPr anchor="b"/>
           <a:lstStyle>
             <a:lvl1pPr>
-              <a:defRPr sz="2400"/>
+              <a:defRPr sz="2112"/>
             </a:lvl1pPr>
           </a:lstStyle>
           <a:p>
@@ -2656,8 +2660,8 @@
         </p:nvSpPr>
         <p:spPr>
           <a:xfrm>
-            <a:off x="2915543" y="2106510"/>
-            <a:ext cx="3471863" cy="10397067"/>
+            <a:off x="2565948" y="2106510"/>
+            <a:ext cx="3055560" cy="10397067"/>
           </a:xfrm>
         </p:spPr>
         <p:txBody>
@@ -2665,39 +2669,39 @@
           <a:lstStyle>
             <a:lvl1pPr marL="0" indent="0">
               <a:buNone/>
-              <a:defRPr sz="2400"/>
+              <a:defRPr sz="2112"/>
             </a:lvl1pPr>
-            <a:lvl2pPr marL="342900" indent="0">
+            <a:lvl2pPr marL="301798" indent="0">
               <a:buNone/>
-              <a:defRPr sz="2100"/>
+              <a:defRPr sz="1848"/>
             </a:lvl2pPr>
-            <a:lvl3pPr marL="685800" indent="0">
+            <a:lvl3pPr marL="603595" indent="0">
               <a:buNone/>
-              <a:defRPr sz="1800"/>
+              <a:defRPr sz="1584"/>
             </a:lvl3pPr>
-            <a:lvl4pPr marL="1028700" indent="0">
+            <a:lvl4pPr marL="905393" indent="0">
               <a:buNone/>
-              <a:defRPr sz="1500"/>
+              <a:defRPr sz="1320"/>
             </a:lvl4pPr>
-            <a:lvl5pPr marL="1371600" indent="0">
+            <a:lvl5pPr marL="1207191" indent="0">
               <a:buNone/>
-              <a:defRPr sz="1500"/>
+              <a:defRPr sz="1320"/>
             </a:lvl5pPr>
-            <a:lvl6pPr marL="1714500" indent="0">
+            <a:lvl6pPr marL="1508989" indent="0">
               <a:buNone/>
-              <a:defRPr sz="1500"/>
+              <a:defRPr sz="1320"/>
             </a:lvl6pPr>
-            <a:lvl7pPr marL="2057400" indent="0">
+            <a:lvl7pPr marL="1810786" indent="0">
               <a:buNone/>
-              <a:defRPr sz="1500"/>
+              <a:defRPr sz="1320"/>
             </a:lvl7pPr>
-            <a:lvl8pPr marL="2400300" indent="0">
+            <a:lvl8pPr marL="2112584" indent="0">
               <a:buNone/>
-              <a:defRPr sz="1500"/>
+              <a:defRPr sz="1320"/>
             </a:lvl8pPr>
-            <a:lvl9pPr marL="2743200" indent="0">
+            <a:lvl9pPr marL="2414382" indent="0">
               <a:buNone/>
-              <a:defRPr sz="1500"/>
+              <a:defRPr sz="1320"/>
             </a:lvl9pPr>
           </a:lstStyle>
           <a:p>
@@ -2721,8 +2725,8 @@
         </p:nvSpPr>
         <p:spPr>
           <a:xfrm>
-            <a:off x="472381" y="4389120"/>
-            <a:ext cx="2211884" cy="8131388"/>
+            <a:off x="415739" y="4389120"/>
+            <a:ext cx="1946662" cy="8131388"/>
           </a:xfrm>
         </p:spPr>
         <p:txBody>
@@ -2730,39 +2734,39 @@
           <a:lstStyle>
             <a:lvl1pPr marL="0" indent="0">
               <a:buNone/>
-              <a:defRPr sz="1200"/>
+              <a:defRPr sz="1056"/>
             </a:lvl1pPr>
-            <a:lvl2pPr marL="342900" indent="0">
+            <a:lvl2pPr marL="301798" indent="0">
               <a:buNone/>
-              <a:defRPr sz="1050"/>
+              <a:defRPr sz="924"/>
             </a:lvl2pPr>
-            <a:lvl3pPr marL="685800" indent="0">
+            <a:lvl3pPr marL="603595" indent="0">
               <a:buNone/>
-              <a:defRPr sz="900"/>
+              <a:defRPr sz="792"/>
             </a:lvl3pPr>
-            <a:lvl4pPr marL="1028700" indent="0">
+            <a:lvl4pPr marL="905393" indent="0">
               <a:buNone/>
-              <a:defRPr sz="750"/>
+              <a:defRPr sz="660"/>
             </a:lvl4pPr>
-            <a:lvl5pPr marL="1371600" indent="0">
+            <a:lvl5pPr marL="1207191" indent="0">
               <a:buNone/>
-              <a:defRPr sz="750"/>
+              <a:defRPr sz="660"/>
             </a:lvl5pPr>
-            <a:lvl6pPr marL="1714500" indent="0">
+            <a:lvl6pPr marL="1508989" indent="0">
               <a:buNone/>
-              <a:defRPr sz="750"/>
+              <a:defRPr sz="660"/>
             </a:lvl6pPr>
-            <a:lvl7pPr marL="2057400" indent="0">
+            <a:lvl7pPr marL="1810786" indent="0">
               <a:buNone/>
-              <a:defRPr sz="750"/>
+              <a:defRPr sz="660"/>
             </a:lvl7pPr>
-            <a:lvl8pPr marL="2400300" indent="0">
+            <a:lvl8pPr marL="2112584" indent="0">
               <a:buNone/>
-              <a:defRPr sz="750"/>
+              <a:defRPr sz="660"/>
             </a:lvl8pPr>
-            <a:lvl9pPr marL="2743200" indent="0">
+            <a:lvl9pPr marL="2414382" indent="0">
               <a:buNone/>
-              <a:defRPr sz="750"/>
+              <a:defRPr sz="660"/>
             </a:lvl9pPr>
           </a:lstStyle>
           <a:p>
@@ -2842,7 +2846,7 @@
     </p:spTree>
     <p:extLst>
       <p:ext uri="{BB962C8B-B14F-4D97-AF65-F5344CB8AC3E}">
-        <p14:creationId xmlns:p14="http://schemas.microsoft.com/office/powerpoint/2010/main" val="1600157505"/>
+        <p14:creationId xmlns:p14="http://schemas.microsoft.com/office/powerpoint/2010/main" val="1965641078"/>
       </p:ext>
     </p:extLst>
   </p:cSld>
@@ -2886,8 +2890,8 @@
         </p:nvSpPr>
         <p:spPr>
           <a:xfrm>
-            <a:off x="471488" y="778936"/>
-            <a:ext cx="5915025" cy="2827868"/>
+            <a:off x="414953" y="778936"/>
+            <a:ext cx="5205770" cy="2827868"/>
           </a:xfrm>
           <a:prstGeom prst="rect">
             <a:avLst/>
@@ -2919,8 +2923,8 @@
         </p:nvSpPr>
         <p:spPr>
           <a:xfrm>
-            <a:off x="471488" y="3894667"/>
-            <a:ext cx="5915025" cy="9282854"/>
+            <a:off x="414953" y="3894667"/>
+            <a:ext cx="5205770" cy="9282854"/>
           </a:xfrm>
           <a:prstGeom prst="rect">
             <a:avLst/>
@@ -2981,8 +2985,8 @@
         </p:nvSpPr>
         <p:spPr>
           <a:xfrm>
-            <a:off x="471488" y="13560217"/>
-            <a:ext cx="1543050" cy="778933"/>
+            <a:off x="414953" y="13560217"/>
+            <a:ext cx="1358027" cy="778933"/>
           </a:xfrm>
           <a:prstGeom prst="rect">
             <a:avLst/>
@@ -2992,7 +2996,7 @@
           <a:bodyPr vert="horz" lIns="91440" tIns="45720" rIns="91440" bIns="45720" rtlCol="0" anchor="ctr"/>
           <a:lstStyle>
             <a:lvl1pPr algn="l">
-              <a:defRPr sz="900">
+              <a:defRPr sz="792">
                 <a:solidFill>
                   <a:schemeClr val="tx1">
                     <a:tint val="75000"/>
@@ -3022,8 +3026,8 @@
         </p:nvSpPr>
         <p:spPr>
           <a:xfrm>
-            <a:off x="2271713" y="13560217"/>
-            <a:ext cx="2314575" cy="778933"/>
+            <a:off x="1999318" y="13560217"/>
+            <a:ext cx="2037040" cy="778933"/>
           </a:xfrm>
           <a:prstGeom prst="rect">
             <a:avLst/>
@@ -3033,7 +3037,7 @@
           <a:bodyPr vert="horz" lIns="91440" tIns="45720" rIns="91440" bIns="45720" rtlCol="0" anchor="ctr"/>
           <a:lstStyle>
             <a:lvl1pPr algn="ctr">
-              <a:defRPr sz="900">
+              <a:defRPr sz="792">
                 <a:solidFill>
                   <a:schemeClr val="tx1">
                     <a:tint val="75000"/>
@@ -3059,8 +3063,8 @@
         </p:nvSpPr>
         <p:spPr>
           <a:xfrm>
-            <a:off x="4843463" y="13560217"/>
-            <a:ext cx="1543050" cy="778933"/>
+            <a:off x="4262695" y="13560217"/>
+            <a:ext cx="1358027" cy="778933"/>
           </a:xfrm>
           <a:prstGeom prst="rect">
             <a:avLst/>
@@ -3070,7 +3074,7 @@
           <a:bodyPr vert="horz" lIns="91440" tIns="45720" rIns="91440" bIns="45720" rtlCol="0" anchor="ctr"/>
           <a:lstStyle>
             <a:lvl1pPr algn="r">
-              <a:defRPr sz="900">
+              <a:defRPr sz="792">
                 <a:solidFill>
                   <a:schemeClr val="tx1">
                     <a:tint val="75000"/>
@@ -3091,27 +3095,27 @@
     </p:spTree>
     <p:extLst>
       <p:ext uri="{BB962C8B-B14F-4D97-AF65-F5344CB8AC3E}">
-        <p14:creationId xmlns:p14="http://schemas.microsoft.com/office/powerpoint/2010/main" val="1386452682"/>
+        <p14:creationId xmlns:p14="http://schemas.microsoft.com/office/powerpoint/2010/main" val="427739257"/>
       </p:ext>
     </p:extLst>
   </p:cSld>
   <p:clrMap bg1="lt1" tx1="dk1" bg2="lt2" tx2="dk2" accent1="accent1" accent2="accent2" accent3="accent3" accent4="accent4" accent5="accent5" accent6="accent6" hlink="hlink" folHlink="folHlink"/>
   <p:sldLayoutIdLst>
-    <p:sldLayoutId id="2147483685" r:id="rId1"/>
-    <p:sldLayoutId id="2147483686" r:id="rId2"/>
-    <p:sldLayoutId id="2147483687" r:id="rId3"/>
-    <p:sldLayoutId id="2147483688" r:id="rId4"/>
-    <p:sldLayoutId id="2147483689" r:id="rId5"/>
-    <p:sldLayoutId id="2147483690" r:id="rId6"/>
-    <p:sldLayoutId id="2147483691" r:id="rId7"/>
-    <p:sldLayoutId id="2147483692" r:id="rId8"/>
-    <p:sldLayoutId id="2147483693" r:id="rId9"/>
-    <p:sldLayoutId id="2147483694" r:id="rId10"/>
-    <p:sldLayoutId id="2147483695" r:id="rId11"/>
+    <p:sldLayoutId id="2147483697" r:id="rId1"/>
+    <p:sldLayoutId id="2147483698" r:id="rId2"/>
+    <p:sldLayoutId id="2147483699" r:id="rId3"/>
+    <p:sldLayoutId id="2147483700" r:id="rId4"/>
+    <p:sldLayoutId id="2147483701" r:id="rId5"/>
+    <p:sldLayoutId id="2147483702" r:id="rId6"/>
+    <p:sldLayoutId id="2147483703" r:id="rId7"/>
+    <p:sldLayoutId id="2147483704" r:id="rId8"/>
+    <p:sldLayoutId id="2147483705" r:id="rId9"/>
+    <p:sldLayoutId id="2147483706" r:id="rId10"/>
+    <p:sldLayoutId id="2147483707" r:id="rId11"/>
   </p:sldLayoutIdLst>
   <p:txStyles>
     <p:titleStyle>
-      <a:lvl1pPr algn="l" defTabSz="685800" rtl="0" eaLnBrk="1" latinLnBrk="0" hangingPunct="1">
+      <a:lvl1pPr algn="l" defTabSz="603595" rtl="0" eaLnBrk="1" latinLnBrk="0" hangingPunct="1">
         <a:lnSpc>
           <a:spcPct val="90000"/>
         </a:lnSpc>
@@ -3119,7 +3123,7 @@
           <a:spcPct val="0"/>
         </a:spcBef>
         <a:buNone/>
-        <a:defRPr sz="3300" kern="1200">
+        <a:defRPr sz="2904" kern="1200">
           <a:solidFill>
             <a:schemeClr val="tx1"/>
           </a:solidFill>
@@ -3130,16 +3134,16 @@
       </a:lvl1pPr>
     </p:titleStyle>
     <p:bodyStyle>
-      <a:lvl1pPr marL="171450" indent="-171450" algn="l" defTabSz="685800" rtl="0" eaLnBrk="1" latinLnBrk="0" hangingPunct="1">
+      <a:lvl1pPr marL="150899" indent="-150899" algn="l" defTabSz="603595" rtl="0" eaLnBrk="1" latinLnBrk="0" hangingPunct="1">
         <a:lnSpc>
           <a:spcPct val="90000"/>
         </a:lnSpc>
         <a:spcBef>
-          <a:spcPts val="750"/>
+          <a:spcPts val="660"/>
         </a:spcBef>
         <a:buFont typeface="Arial" panose="020B0604020202020204" pitchFamily="34" charset="0"/>
         <a:buChar char="•"/>
-        <a:defRPr sz="2100" kern="1200">
+        <a:defRPr sz="1848" kern="1200">
           <a:solidFill>
             <a:schemeClr val="tx1"/>
           </a:solidFill>
@@ -3148,16 +3152,16 @@
           <a:cs typeface="+mn-cs"/>
         </a:defRPr>
       </a:lvl1pPr>
-      <a:lvl2pPr marL="514350" indent="-171450" algn="l" defTabSz="685800" rtl="0" eaLnBrk="1" latinLnBrk="0" hangingPunct="1">
+      <a:lvl2pPr marL="452697" indent="-150899" algn="l" defTabSz="603595" rtl="0" eaLnBrk="1" latinLnBrk="0" hangingPunct="1">
         <a:lnSpc>
           <a:spcPct val="90000"/>
         </a:lnSpc>
         <a:spcBef>
-          <a:spcPts val="375"/>
+          <a:spcPts val="330"/>
         </a:spcBef>
         <a:buFont typeface="Arial" panose="020B0604020202020204" pitchFamily="34" charset="0"/>
         <a:buChar char="•"/>
-        <a:defRPr sz="1800" kern="1200">
+        <a:defRPr sz="1584" kern="1200">
           <a:solidFill>
             <a:schemeClr val="tx1"/>
           </a:solidFill>
@@ -3166,16 +3170,16 @@
           <a:cs typeface="+mn-cs"/>
         </a:defRPr>
       </a:lvl2pPr>
-      <a:lvl3pPr marL="857250" indent="-171450" algn="l" defTabSz="685800" rtl="0" eaLnBrk="1" latinLnBrk="0" hangingPunct="1">
+      <a:lvl3pPr marL="754494" indent="-150899" algn="l" defTabSz="603595" rtl="0" eaLnBrk="1" latinLnBrk="0" hangingPunct="1">
         <a:lnSpc>
           <a:spcPct val="90000"/>
         </a:lnSpc>
         <a:spcBef>
-          <a:spcPts val="375"/>
+          <a:spcPts val="330"/>
         </a:spcBef>
         <a:buFont typeface="Arial" panose="020B0604020202020204" pitchFamily="34" charset="0"/>
         <a:buChar char="•"/>
-        <a:defRPr sz="1500" kern="1200">
+        <a:defRPr sz="1320" kern="1200">
           <a:solidFill>
             <a:schemeClr val="tx1"/>
           </a:solidFill>
@@ -3184,16 +3188,16 @@
           <a:cs typeface="+mn-cs"/>
         </a:defRPr>
       </a:lvl3pPr>
-      <a:lvl4pPr marL="1200150" indent="-171450" algn="l" defTabSz="685800" rtl="0" eaLnBrk="1" latinLnBrk="0" hangingPunct="1">
+      <a:lvl4pPr marL="1056292" indent="-150899" algn="l" defTabSz="603595" rtl="0" eaLnBrk="1" latinLnBrk="0" hangingPunct="1">
         <a:lnSpc>
           <a:spcPct val="90000"/>
         </a:lnSpc>
         <a:spcBef>
-          <a:spcPts val="375"/>
+          <a:spcPts val="330"/>
         </a:spcBef>
         <a:buFont typeface="Arial" panose="020B0604020202020204" pitchFamily="34" charset="0"/>
         <a:buChar char="•"/>
-        <a:defRPr sz="1350" kern="1200">
+        <a:defRPr sz="1188" kern="1200">
           <a:solidFill>
             <a:schemeClr val="tx1"/>
           </a:solidFill>
@@ -3202,16 +3206,16 @@
           <a:cs typeface="+mn-cs"/>
         </a:defRPr>
       </a:lvl4pPr>
-      <a:lvl5pPr marL="1543050" indent="-171450" algn="l" defTabSz="685800" rtl="0" eaLnBrk="1" latinLnBrk="0" hangingPunct="1">
+      <a:lvl5pPr marL="1358090" indent="-150899" algn="l" defTabSz="603595" rtl="0" eaLnBrk="1" latinLnBrk="0" hangingPunct="1">
         <a:lnSpc>
           <a:spcPct val="90000"/>
         </a:lnSpc>
         <a:spcBef>
-          <a:spcPts val="375"/>
+          <a:spcPts val="330"/>
         </a:spcBef>
         <a:buFont typeface="Arial" panose="020B0604020202020204" pitchFamily="34" charset="0"/>
         <a:buChar char="•"/>
-        <a:defRPr sz="1350" kern="1200">
+        <a:defRPr sz="1188" kern="1200">
           <a:solidFill>
             <a:schemeClr val="tx1"/>
           </a:solidFill>
@@ -3220,16 +3224,16 @@
           <a:cs typeface="+mn-cs"/>
         </a:defRPr>
       </a:lvl5pPr>
-      <a:lvl6pPr marL="1885950" indent="-171450" algn="l" defTabSz="685800" rtl="0" eaLnBrk="1" latinLnBrk="0" hangingPunct="1">
+      <a:lvl6pPr marL="1659887" indent="-150899" algn="l" defTabSz="603595" rtl="0" eaLnBrk="1" latinLnBrk="0" hangingPunct="1">
         <a:lnSpc>
           <a:spcPct val="90000"/>
         </a:lnSpc>
         <a:spcBef>
-          <a:spcPts val="375"/>
+          <a:spcPts val="330"/>
         </a:spcBef>
         <a:buFont typeface="Arial" panose="020B0604020202020204" pitchFamily="34" charset="0"/>
         <a:buChar char="•"/>
-        <a:defRPr sz="1350" kern="1200">
+        <a:defRPr sz="1188" kern="1200">
           <a:solidFill>
             <a:schemeClr val="tx1"/>
           </a:solidFill>
@@ -3238,16 +3242,16 @@
           <a:cs typeface="+mn-cs"/>
         </a:defRPr>
       </a:lvl6pPr>
-      <a:lvl7pPr marL="2228850" indent="-171450" algn="l" defTabSz="685800" rtl="0" eaLnBrk="1" latinLnBrk="0" hangingPunct="1">
+      <a:lvl7pPr marL="1961685" indent="-150899" algn="l" defTabSz="603595" rtl="0" eaLnBrk="1" latinLnBrk="0" hangingPunct="1">
         <a:lnSpc>
           <a:spcPct val="90000"/>
         </a:lnSpc>
         <a:spcBef>
-          <a:spcPts val="375"/>
+          <a:spcPts val="330"/>
         </a:spcBef>
         <a:buFont typeface="Arial" panose="020B0604020202020204" pitchFamily="34" charset="0"/>
         <a:buChar char="•"/>
-        <a:defRPr sz="1350" kern="1200">
+        <a:defRPr sz="1188" kern="1200">
           <a:solidFill>
             <a:schemeClr val="tx1"/>
           </a:solidFill>
@@ -3256,16 +3260,16 @@
           <a:cs typeface="+mn-cs"/>
         </a:defRPr>
       </a:lvl7pPr>
-      <a:lvl8pPr marL="2571750" indent="-171450" algn="l" defTabSz="685800" rtl="0" eaLnBrk="1" latinLnBrk="0" hangingPunct="1">
+      <a:lvl8pPr marL="2263483" indent="-150899" algn="l" defTabSz="603595" rtl="0" eaLnBrk="1" latinLnBrk="0" hangingPunct="1">
         <a:lnSpc>
           <a:spcPct val="90000"/>
         </a:lnSpc>
         <a:spcBef>
-          <a:spcPts val="375"/>
+          <a:spcPts val="330"/>
         </a:spcBef>
         <a:buFont typeface="Arial" panose="020B0604020202020204" pitchFamily="34" charset="0"/>
         <a:buChar char="•"/>
-        <a:defRPr sz="1350" kern="1200">
+        <a:defRPr sz="1188" kern="1200">
           <a:solidFill>
             <a:schemeClr val="tx1"/>
           </a:solidFill>
@@ -3274,16 +3278,16 @@
           <a:cs typeface="+mn-cs"/>
         </a:defRPr>
       </a:lvl8pPr>
-      <a:lvl9pPr marL="2914650" indent="-171450" algn="l" defTabSz="685800" rtl="0" eaLnBrk="1" latinLnBrk="0" hangingPunct="1">
+      <a:lvl9pPr marL="2565281" indent="-150899" algn="l" defTabSz="603595" rtl="0" eaLnBrk="1" latinLnBrk="0" hangingPunct="1">
         <a:lnSpc>
           <a:spcPct val="90000"/>
         </a:lnSpc>
         <a:spcBef>
-          <a:spcPts val="375"/>
+          <a:spcPts val="330"/>
         </a:spcBef>
         <a:buFont typeface="Arial" panose="020B0604020202020204" pitchFamily="34" charset="0"/>
         <a:buChar char="•"/>
-        <a:defRPr sz="1350" kern="1200">
+        <a:defRPr sz="1188" kern="1200">
           <a:solidFill>
             <a:schemeClr val="tx1"/>
           </a:solidFill>
@@ -3297,8 +3301,8 @@
       <a:defPPr>
         <a:defRPr lang="en-US"/>
       </a:defPPr>
-      <a:lvl1pPr marL="0" algn="l" defTabSz="685800" rtl="0" eaLnBrk="1" latinLnBrk="0" hangingPunct="1">
-        <a:defRPr sz="1350" kern="1200">
+      <a:lvl1pPr marL="0" algn="l" defTabSz="603595" rtl="0" eaLnBrk="1" latinLnBrk="0" hangingPunct="1">
+        <a:defRPr sz="1188" kern="1200">
           <a:solidFill>
             <a:schemeClr val="tx1"/>
           </a:solidFill>
@@ -3307,8 +3311,8 @@
           <a:cs typeface="+mn-cs"/>
         </a:defRPr>
       </a:lvl1pPr>
-      <a:lvl2pPr marL="342900" algn="l" defTabSz="685800" rtl="0" eaLnBrk="1" latinLnBrk="0" hangingPunct="1">
-        <a:defRPr sz="1350" kern="1200">
+      <a:lvl2pPr marL="301798" algn="l" defTabSz="603595" rtl="0" eaLnBrk="1" latinLnBrk="0" hangingPunct="1">
+        <a:defRPr sz="1188" kern="1200">
           <a:solidFill>
             <a:schemeClr val="tx1"/>
           </a:solidFill>
@@ -3317,8 +3321,8 @@
           <a:cs typeface="+mn-cs"/>
         </a:defRPr>
       </a:lvl2pPr>
-      <a:lvl3pPr marL="685800" algn="l" defTabSz="685800" rtl="0" eaLnBrk="1" latinLnBrk="0" hangingPunct="1">
-        <a:defRPr sz="1350" kern="1200">
+      <a:lvl3pPr marL="603595" algn="l" defTabSz="603595" rtl="0" eaLnBrk="1" latinLnBrk="0" hangingPunct="1">
+        <a:defRPr sz="1188" kern="1200">
           <a:solidFill>
             <a:schemeClr val="tx1"/>
           </a:solidFill>
@@ -3327,8 +3331,8 @@
           <a:cs typeface="+mn-cs"/>
         </a:defRPr>
       </a:lvl3pPr>
-      <a:lvl4pPr marL="1028700" algn="l" defTabSz="685800" rtl="0" eaLnBrk="1" latinLnBrk="0" hangingPunct="1">
-        <a:defRPr sz="1350" kern="1200">
+      <a:lvl4pPr marL="905393" algn="l" defTabSz="603595" rtl="0" eaLnBrk="1" latinLnBrk="0" hangingPunct="1">
+        <a:defRPr sz="1188" kern="1200">
           <a:solidFill>
             <a:schemeClr val="tx1"/>
           </a:solidFill>
@@ -3337,8 +3341,8 @@
           <a:cs typeface="+mn-cs"/>
         </a:defRPr>
       </a:lvl4pPr>
-      <a:lvl5pPr marL="1371600" algn="l" defTabSz="685800" rtl="0" eaLnBrk="1" latinLnBrk="0" hangingPunct="1">
-        <a:defRPr sz="1350" kern="1200">
+      <a:lvl5pPr marL="1207191" algn="l" defTabSz="603595" rtl="0" eaLnBrk="1" latinLnBrk="0" hangingPunct="1">
+        <a:defRPr sz="1188" kern="1200">
           <a:solidFill>
             <a:schemeClr val="tx1"/>
           </a:solidFill>
@@ -3347,8 +3351,8 @@
           <a:cs typeface="+mn-cs"/>
         </a:defRPr>
       </a:lvl5pPr>
-      <a:lvl6pPr marL="1714500" algn="l" defTabSz="685800" rtl="0" eaLnBrk="1" latinLnBrk="0" hangingPunct="1">
-        <a:defRPr sz="1350" kern="1200">
+      <a:lvl6pPr marL="1508989" algn="l" defTabSz="603595" rtl="0" eaLnBrk="1" latinLnBrk="0" hangingPunct="1">
+        <a:defRPr sz="1188" kern="1200">
           <a:solidFill>
             <a:schemeClr val="tx1"/>
           </a:solidFill>
@@ -3357,8 +3361,8 @@
           <a:cs typeface="+mn-cs"/>
         </a:defRPr>
       </a:lvl6pPr>
-      <a:lvl7pPr marL="2057400" algn="l" defTabSz="685800" rtl="0" eaLnBrk="1" latinLnBrk="0" hangingPunct="1">
-        <a:defRPr sz="1350" kern="1200">
+      <a:lvl7pPr marL="1810786" algn="l" defTabSz="603595" rtl="0" eaLnBrk="1" latinLnBrk="0" hangingPunct="1">
+        <a:defRPr sz="1188" kern="1200">
           <a:solidFill>
             <a:schemeClr val="tx1"/>
           </a:solidFill>
@@ -3367,8 +3371,8 @@
           <a:cs typeface="+mn-cs"/>
         </a:defRPr>
       </a:lvl7pPr>
-      <a:lvl8pPr marL="2400300" algn="l" defTabSz="685800" rtl="0" eaLnBrk="1" latinLnBrk="0" hangingPunct="1">
-        <a:defRPr sz="1350" kern="1200">
+      <a:lvl8pPr marL="2112584" algn="l" defTabSz="603595" rtl="0" eaLnBrk="1" latinLnBrk="0" hangingPunct="1">
+        <a:defRPr sz="1188" kern="1200">
           <a:solidFill>
             <a:schemeClr val="tx1"/>
           </a:solidFill>
@@ -3377,8 +3381,8 @@
           <a:cs typeface="+mn-cs"/>
         </a:defRPr>
       </a:lvl8pPr>
-      <a:lvl9pPr marL="2743200" algn="l" defTabSz="685800" rtl="0" eaLnBrk="1" latinLnBrk="0" hangingPunct="1">
-        <a:defRPr sz="1350" kern="1200">
+      <a:lvl9pPr marL="2414382" algn="l" defTabSz="603595" rtl="0" eaLnBrk="1" latinLnBrk="0" hangingPunct="1">
+        <a:defRPr sz="1188" kern="1200">
           <a:solidFill>
             <a:schemeClr val="tx1"/>
           </a:solidFill>
@@ -3409,74 +3413,6 @@
           <a:chExt cx="0" cy="0"/>
         </a:xfrm>
       </p:grpSpPr>
-      <p:sp>
-        <p:nvSpPr>
-          <p:cNvPr id="2" name="Title 1"/>
-          <p:cNvSpPr>
-            <a:spLocks noGrp="1"/>
-          </p:cNvSpPr>
-          <p:nvPr>
-            <p:ph type="ctrTitle"/>
-          </p:nvPr>
-        </p:nvSpPr>
-        <p:spPr/>
-        <p:txBody>
-          <a:bodyPr/>
-          <a:lstStyle/>
-          <a:p>
-            <a:endParaRPr lang="en-US" dirty="0"/>
-          </a:p>
-        </p:txBody>
-      </p:sp>
-      <p:sp>
-        <p:nvSpPr>
-          <p:cNvPr id="3" name="Subtitle 2"/>
-          <p:cNvSpPr>
-            <a:spLocks noGrp="1"/>
-          </p:cNvSpPr>
-          <p:nvPr>
-            <p:ph type="subTitle" idx="1"/>
-          </p:nvPr>
-        </p:nvSpPr>
-        <p:spPr/>
-        <p:txBody>
-          <a:bodyPr/>
-          <a:lstStyle/>
-          <a:p>
-            <a:endParaRPr lang="en-US"/>
-          </a:p>
-        </p:txBody>
-      </p:sp>
-    </p:spTree>
-    <p:extLst>
-      <p:ext uri="{BB962C8B-B14F-4D97-AF65-F5344CB8AC3E}">
-        <p14:creationId xmlns:p14="http://schemas.microsoft.com/office/powerpoint/2010/main" val="17198300"/>
-      </p:ext>
-    </p:extLst>
-  </p:cSld>
-  <p:clrMapOvr>
-    <a:masterClrMapping/>
-  </p:clrMapOvr>
-</p:sld>
-</file>
-
-<file path=ppt/slides/slide2.xml><?xml version="1.0" encoding="utf-8"?>
-<p:sld xmlns:a="http://schemas.openxmlformats.org/drawingml/2006/main" xmlns:r="http://schemas.openxmlformats.org/officeDocument/2006/relationships" xmlns:p="http://schemas.openxmlformats.org/presentationml/2006/main">
-  <p:cSld>
-    <p:spTree>
-      <p:nvGrpSpPr>
-        <p:cNvPr id="1" name=""/>
-        <p:cNvGrpSpPr/>
-        <p:nvPr/>
-      </p:nvGrpSpPr>
-      <p:grpSpPr>
-        <a:xfrm>
-          <a:off x="0" y="0"/>
-          <a:ext cx="0" cy="0"/>
-          <a:chOff x="0" y="0"/>
-          <a:chExt cx="0" cy="0"/>
-        </a:xfrm>
-      </p:grpSpPr>
       <p:grpSp>
         <p:nvGrpSpPr>
           <p:cNvPr id="591" name="Group 590"/>
@@ -3485,7 +3421,7 @@
         </p:nvGrpSpPr>
         <p:grpSpPr>
           <a:xfrm>
-            <a:off x="1696019" y="12937262"/>
+            <a:off x="1008422" y="12937263"/>
             <a:ext cx="2525922" cy="331805"/>
             <a:chOff x="1692360" y="12954274"/>
             <a:chExt cx="2525922" cy="331805"/>
@@ -4332,7 +4268,7 @@
         </p:nvGrpSpPr>
         <p:grpSpPr>
           <a:xfrm>
-            <a:off x="1505233" y="3311179"/>
+            <a:off x="817636" y="3311179"/>
             <a:ext cx="1135852" cy="1135852"/>
             <a:chOff x="2204806" y="-23741"/>
             <a:chExt cx="1135852" cy="1135852"/>
@@ -7546,7 +7482,7 @@
         </p:nvGrpSpPr>
         <p:grpSpPr>
           <a:xfrm>
-            <a:off x="3966952" y="3308322"/>
+            <a:off x="3279355" y="3308322"/>
             <a:ext cx="1135852" cy="1135852"/>
             <a:chOff x="4859884" y="1045858"/>
             <a:chExt cx="1135852" cy="1135852"/>
@@ -9649,7 +9585,7 @@
         </p:nvSpPr>
         <p:spPr>
           <a:xfrm rot="2700000">
-            <a:off x="1508514" y="4434558"/>
+            <a:off x="820917" y="4434559"/>
             <a:ext cx="438044" cy="307777"/>
           </a:xfrm>
           <a:prstGeom prst="rect">
@@ -9678,7 +9614,7 @@
         </p:nvSpPr>
         <p:spPr>
           <a:xfrm rot="2700000">
-            <a:off x="2617484" y="3330498"/>
+            <a:off x="1929887" y="3330499"/>
             <a:ext cx="438044" cy="307777"/>
           </a:xfrm>
           <a:prstGeom prst="rect">
@@ -9707,7 +9643,7 @@
         </p:nvSpPr>
         <p:spPr>
           <a:xfrm rot="2700000">
-            <a:off x="3979276" y="4425577"/>
+            <a:off x="3291679" y="4425578"/>
             <a:ext cx="438044" cy="307777"/>
           </a:xfrm>
           <a:prstGeom prst="rect">
@@ -9736,7 +9672,7 @@
         </p:nvSpPr>
         <p:spPr>
           <a:xfrm rot="2700000">
-            <a:off x="5088246" y="3321517"/>
+            <a:off x="4400649" y="3321518"/>
             <a:ext cx="438044" cy="307777"/>
           </a:xfrm>
           <a:prstGeom prst="rect">
@@ -9765,7 +9701,7 @@
         </p:nvGrpSpPr>
         <p:grpSpPr>
           <a:xfrm>
-            <a:off x="1822498" y="3635412"/>
+            <a:off x="1134901" y="3635412"/>
             <a:ext cx="1135852" cy="1135852"/>
             <a:chOff x="2055498" y="899891"/>
             <a:chExt cx="1135852" cy="1135852"/>
@@ -13568,7 +13504,7 @@
         </p:nvGrpSpPr>
         <p:grpSpPr>
           <a:xfrm>
-            <a:off x="4286930" y="3646340"/>
+            <a:off x="3599333" y="3646340"/>
             <a:ext cx="1135852" cy="1135852"/>
             <a:chOff x="4899990" y="-165312"/>
             <a:chExt cx="1135852" cy="1135852"/>
@@ -15612,7 +15548,7 @@
         </p:nvGrpSpPr>
         <p:grpSpPr>
           <a:xfrm>
-            <a:off x="1609214" y="381182"/>
+            <a:off x="921617" y="381182"/>
             <a:ext cx="1135852" cy="1135852"/>
             <a:chOff x="2204806" y="-23741"/>
             <a:chExt cx="1135852" cy="1135852"/>
@@ -18826,7 +18762,7 @@
         </p:nvGrpSpPr>
         <p:grpSpPr>
           <a:xfrm>
-            <a:off x="1791154" y="537670"/>
+            <a:off x="1103557" y="537670"/>
             <a:ext cx="1135852" cy="1135852"/>
             <a:chOff x="2055498" y="899891"/>
             <a:chExt cx="1135852" cy="1135852"/>
@@ -22629,7 +22565,7 @@
         </p:nvGrpSpPr>
         <p:grpSpPr>
           <a:xfrm>
-            <a:off x="3991421" y="358447"/>
+            <a:off x="3303824" y="358447"/>
             <a:ext cx="1135852" cy="1135852"/>
             <a:chOff x="4859884" y="1045858"/>
             <a:chExt cx="1135852" cy="1135852"/>
@@ -24732,7 +24668,7 @@
         </p:nvGrpSpPr>
         <p:grpSpPr>
           <a:xfrm>
-            <a:off x="4176074" y="528720"/>
+            <a:off x="3488477" y="528720"/>
             <a:ext cx="1135852" cy="1135852"/>
             <a:chOff x="4899990" y="-165312"/>
             <a:chExt cx="1135852" cy="1135852"/>
@@ -26776,7 +26712,7 @@
         </p:nvSpPr>
         <p:spPr>
           <a:xfrm>
-            <a:off x="1123174" y="1900519"/>
+            <a:off x="435578" y="1900519"/>
             <a:ext cx="6276803" cy="400110"/>
           </a:xfrm>
           <a:prstGeom prst="rect">
@@ -26817,7 +26753,7 @@
         </p:nvCxnSpPr>
         <p:spPr>
           <a:xfrm>
-            <a:off x="3597788" y="2477988"/>
+            <a:off x="2910191" y="2477988"/>
             <a:ext cx="0" cy="541738"/>
           </a:xfrm>
           <a:prstGeom prst="straightConnector1">
@@ -26853,7 +26789,7 @@
         </p:nvSpPr>
         <p:spPr>
           <a:xfrm>
-            <a:off x="3674716" y="2551530"/>
+            <a:off x="2987120" y="2551531"/>
             <a:ext cx="3153139" cy="307777"/>
           </a:xfrm>
           <a:prstGeom prst="rect">
@@ -26894,7 +26830,7 @@
         </p:nvSpPr>
         <p:spPr>
           <a:xfrm>
-            <a:off x="2019130" y="5966095"/>
+            <a:off x="1331533" y="5966096"/>
             <a:ext cx="1712434" cy="547793"/>
           </a:xfrm>
           <a:prstGeom prst="roundRect">
@@ -26954,7 +26890,7 @@
         </p:nvSpPr>
         <p:spPr>
           <a:xfrm>
-            <a:off x="1074124" y="5045547"/>
+            <a:off x="386528" y="5045547"/>
             <a:ext cx="6276803" cy="400110"/>
           </a:xfrm>
           <a:prstGeom prst="rect">
@@ -26974,11 +26910,15 @@
             </a:r>
             <a:r>
               <a:rPr lang="en-US" sz="2000" dirty="0"/>
-              <a:t> microscopy images          n x </a:t>
+              <a:t> microscopy images         </a:t>
             </a:r>
             <a:r>
               <a:rPr lang="en-US" sz="2000" b="1" dirty="0"/>
-              <a:t>M</a:t>
+              <a:t>n </a:t>
+            </a:r>
+            <a:r>
+              <a:rPr lang="en-US" sz="2000" b="1" dirty="0"/>
+              <a:t>x M</a:t>
             </a:r>
             <a:r>
               <a:rPr lang="en-US" sz="2000" dirty="0"/>
@@ -26995,13 +26935,13 @@
         </p:nvSpPr>
         <p:spPr>
           <a:xfrm rot="16200000">
-            <a:off x="2228256" y="4431912"/>
+            <a:off x="1540660" y="4431913"/>
             <a:ext cx="452535" cy="2415159"/>
           </a:xfrm>
           <a:prstGeom prst="leftBrace">
             <a:avLst/>
           </a:prstGeom>
-          <a:ln>
+          <a:ln w="12700">
             <a:solidFill>
               <a:schemeClr val="tx1"/>
             </a:solidFill>
@@ -27043,7 +26983,7 @@
         </p:nvCxnSpPr>
         <p:spPr>
           <a:xfrm>
-            <a:off x="2800046" y="6726673"/>
+            <a:off x="2112449" y="6726673"/>
             <a:ext cx="0" cy="520284"/>
           </a:xfrm>
           <a:prstGeom prst="straightConnector1">
@@ -27079,7 +27019,7 @@
         </p:nvGrpSpPr>
         <p:grpSpPr>
           <a:xfrm rot="16200000">
-            <a:off x="2078722" y="7450951"/>
+            <a:off x="1391125" y="7450952"/>
             <a:ext cx="1135852" cy="1135851"/>
             <a:chOff x="3031945" y="8202066"/>
             <a:chExt cx="2141000" cy="2141000"/>
@@ -27586,7 +27526,7 @@
         </p:nvGrpSpPr>
         <p:grpSpPr>
           <a:xfrm>
-            <a:off x="2511751" y="7856193"/>
+            <a:off x="1824155" y="7856194"/>
             <a:ext cx="1144111" cy="1144111"/>
             <a:chOff x="2822307" y="4976100"/>
             <a:chExt cx="2156569" cy="2156569"/>
@@ -28093,7 +28033,7 @@
         </p:nvGrpSpPr>
         <p:grpSpPr>
           <a:xfrm>
-            <a:off x="2655346" y="7953891"/>
+            <a:off x="1967749" y="7953891"/>
             <a:ext cx="1135852" cy="1135852"/>
             <a:chOff x="573928" y="4963461"/>
             <a:chExt cx="2169209" cy="2169209"/>
@@ -28655,7 +28595,7 @@
         </p:nvSpPr>
         <p:spPr>
           <a:xfrm rot="2700000">
-            <a:off x="2140419" y="8609336"/>
+            <a:off x="1452822" y="8609337"/>
             <a:ext cx="438044" cy="307777"/>
           </a:xfrm>
           <a:prstGeom prst="rect">
@@ -28684,7 +28624,7 @@
         </p:nvSpPr>
         <p:spPr>
           <a:xfrm rot="2700000">
-            <a:off x="3234399" y="7482791"/>
+            <a:off x="2546802" y="7482792"/>
             <a:ext cx="438044" cy="307777"/>
           </a:xfrm>
           <a:prstGeom prst="rect">
@@ -28713,7 +28653,7 @@
         </p:nvSpPr>
         <p:spPr>
           <a:xfrm>
-            <a:off x="3932314" y="7845868"/>
+            <a:off x="3244718" y="7845868"/>
             <a:ext cx="2358327" cy="707886"/>
           </a:xfrm>
           <a:prstGeom prst="rect">
@@ -28752,7 +28692,7 @@
         </p:nvCxnSpPr>
         <p:spPr>
           <a:xfrm>
-            <a:off x="3063670" y="9220142"/>
+            <a:off x="2376073" y="9220143"/>
             <a:ext cx="0" cy="449175"/>
           </a:xfrm>
           <a:prstGeom prst="straightConnector1">
@@ -28788,7 +28728,7 @@
         </p:nvSpPr>
         <p:spPr>
           <a:xfrm>
-            <a:off x="3132307" y="6730913"/>
+            <a:off x="2444711" y="6730913"/>
             <a:ext cx="3532321" cy="523220"/>
           </a:xfrm>
           <a:prstGeom prst="rect">
@@ -28835,7 +28775,7 @@
         </p:nvSpPr>
         <p:spPr>
           <a:xfrm>
-            <a:off x="1968946" y="9823100"/>
+            <a:off x="1281349" y="9823101"/>
             <a:ext cx="2103488" cy="759735"/>
           </a:xfrm>
           <a:prstGeom prst="roundRect">
@@ -28906,7 +28846,7 @@
         </p:nvCxnSpPr>
         <p:spPr>
           <a:xfrm>
-            <a:off x="3038145" y="10742277"/>
+            <a:off x="2350548" y="10742277"/>
             <a:ext cx="0" cy="442154"/>
           </a:xfrm>
           <a:prstGeom prst="straightConnector1">
@@ -28942,7 +28882,7 @@
         </p:nvSpPr>
         <p:spPr>
           <a:xfrm>
-            <a:off x="1849678" y="11332777"/>
+            <a:off x="1162082" y="11332778"/>
             <a:ext cx="2390455" cy="869255"/>
           </a:xfrm>
           <a:prstGeom prst="roundRect">
@@ -29002,7 +28942,7 @@
         </p:nvSpPr>
         <p:spPr>
           <a:xfrm>
-            <a:off x="1770033" y="13843687"/>
+            <a:off x="1082437" y="13843687"/>
             <a:ext cx="2988319" cy="369332"/>
           </a:xfrm>
           <a:prstGeom prst="rect">
@@ -29035,7 +28975,6 @@
               <a:rPr lang="en-US" dirty="0"/>
               <a:t>matrices</a:t>
             </a:r>
-            <a:endParaRPr lang="en-US" dirty="0"/>
           </a:p>
         </p:txBody>
       </p:sp>
@@ -29047,7 +28986,7 @@
         </p:nvCxnSpPr>
         <p:spPr>
           <a:xfrm flipH="1" flipV="1">
-            <a:off x="4336494" y="10219001"/>
+            <a:off x="3648897" y="10197737"/>
             <a:ext cx="80210" cy="1633906"/>
           </a:xfrm>
           <a:prstGeom prst="curvedConnector3">
@@ -29085,7 +29024,7 @@
         </p:nvSpPr>
         <p:spPr>
           <a:xfrm>
-            <a:off x="4862927" y="10784728"/>
+            <a:off x="4071719" y="10809466"/>
             <a:ext cx="1730731" cy="307777"/>
           </a:xfrm>
           <a:prstGeom prst="rect">
@@ -29123,7 +29062,7 @@
         </p:nvCxnSpPr>
         <p:spPr>
           <a:xfrm flipH="1" flipV="1">
-            <a:off x="3046991" y="12319244"/>
+            <a:off x="2359395" y="12319245"/>
             <a:ext cx="1" cy="483533"/>
           </a:xfrm>
           <a:prstGeom prst="straightConnector1">
@@ -29159,7 +29098,7 @@
         </p:nvGrpSpPr>
         <p:grpSpPr>
           <a:xfrm>
-            <a:off x="4343279" y="687006"/>
+            <a:off x="3655682" y="687006"/>
             <a:ext cx="1135852" cy="1135852"/>
             <a:chOff x="3544527" y="1048755"/>
             <a:chExt cx="1135852" cy="1135852"/>
@@ -31258,7 +31197,7 @@
         </p:nvGrpSpPr>
         <p:grpSpPr>
           <a:xfrm>
-            <a:off x="1940462" y="681813"/>
+            <a:off x="1252865" y="681813"/>
             <a:ext cx="1135852" cy="1135852"/>
             <a:chOff x="2204806" y="1044034"/>
             <a:chExt cx="1135852" cy="1135852"/>
@@ -34321,7 +34260,7 @@
         </p:nvGrpSpPr>
         <p:grpSpPr>
           <a:xfrm rot="10800000">
-            <a:off x="1979513" y="3778948"/>
+            <a:off x="1291916" y="3778948"/>
             <a:ext cx="1135852" cy="1135852"/>
             <a:chOff x="2204806" y="1044034"/>
             <a:chExt cx="1135852" cy="1135852"/>
@@ -37384,7 +37323,7 @@
         </p:nvGrpSpPr>
         <p:grpSpPr>
           <a:xfrm>
-            <a:off x="4464694" y="3808122"/>
+            <a:off x="3777097" y="3808122"/>
             <a:ext cx="1135852" cy="1135852"/>
             <a:chOff x="4385182" y="3615847"/>
             <a:chExt cx="1135852" cy="1135852"/>
@@ -39483,7 +39422,7 @@
         </p:nvGrpSpPr>
         <p:grpSpPr>
           <a:xfrm>
-            <a:off x="1969066" y="13277421"/>
+            <a:off x="1281469" y="13277422"/>
             <a:ext cx="2525922" cy="331805"/>
             <a:chOff x="3520700" y="12124550"/>
             <a:chExt cx="2525922" cy="331805"/>
@@ -40330,7 +40269,7 @@
         </p:nvGrpSpPr>
         <p:grpSpPr>
           <a:xfrm flipH="1">
-            <a:off x="2118966" y="13435611"/>
+            <a:off x="1431369" y="13435612"/>
             <a:ext cx="2525922" cy="328819"/>
             <a:chOff x="3673100" y="12279936"/>
             <a:chExt cx="2525922" cy="328819"/>
@@ -41177,7 +41116,7 @@
         </p:nvSpPr>
         <p:spPr>
           <a:xfrm rot="2700000">
-            <a:off x="1637936" y="13276056"/>
+            <a:off x="950339" y="13276057"/>
             <a:ext cx="438044" cy="307777"/>
           </a:xfrm>
           <a:prstGeom prst="rect">
@@ -41206,7 +41145,7 @@
         </p:nvSpPr>
         <p:spPr>
           <a:xfrm rot="2700000">
-            <a:off x="4192584" y="12966606"/>
+            <a:off x="3504987" y="12966607"/>
             <a:ext cx="438044" cy="307777"/>
           </a:xfrm>
           <a:prstGeom prst="rect">

</xml_diff>